<commit_message>
Update to presentation (better/new animations)
</commit_message>
<xml_diff>
--- a/Presentation/FINAL_PRESENTATION_AIS_GROUP3.pptx
+++ b/Presentation/FINAL_PRESENTATION_AIS_GROUP3.pptx
@@ -150,7 +150,7 @@
   </p:defaultTextStyle>
   <p:extLst>
     <p:ext uri="{EFAFB233-063F-42B5-8137-9DF3F51BA10A}">
-      <p15:sldGuideLst xmlns:p15="http://schemas.microsoft.com/office/powerpoint/2012/main" xmlns="">
+      <p15:sldGuideLst xmlns:p15="http://schemas.microsoft.com/office/powerpoint/2012/main">
         <p15:guide id="1" orient="horz" pos="2160">
           <p15:clr>
             <a:srgbClr val="A4A3A4"/>
@@ -6333,7 +6333,7 @@
                                         <p:tgtEl>
                                           <p:spTgt spid="3">
                                             <p:txEl>
-                                              <p:pRg st="1" end="1"/>
+                                              <p:pRg st="0" end="0"/>
                                             </p:txEl>
                                           </p:spTgt>
                                         </p:tgtEl>
@@ -6382,7 +6382,7 @@
                                         <p:tgtEl>
                                           <p:spTgt spid="3">
                                             <p:txEl>
-                                              <p:pRg st="2" end="2"/>
+                                              <p:pRg st="1" end="1"/>
                                             </p:txEl>
                                           </p:spTgt>
                                         </p:tgtEl>
@@ -6431,7 +6431,7 @@
                                         <p:tgtEl>
                                           <p:spTgt spid="3">
                                             <p:txEl>
-                                              <p:pRg st="3" end="3"/>
+                                              <p:pRg st="2" end="2"/>
                                             </p:txEl>
                                           </p:spTgt>
                                         </p:tgtEl>
@@ -6480,6 +6480,55 @@
                                         <p:tgtEl>
                                           <p:spTgt spid="3">
                                             <p:txEl>
+                                              <p:pRg st="3" end="3"/>
+                                            </p:txEl>
+                                          </p:spTgt>
+                                        </p:tgtEl>
+                                        <p:attrNameLst>
+                                          <p:attrName>style.visibility</p:attrName>
+                                        </p:attrNameLst>
+                                      </p:cBhvr>
+                                      <p:to>
+                                        <p:strVal val="visible"/>
+                                      </p:to>
+                                    </p:set>
+                                  </p:childTnLst>
+                                </p:cTn>
+                              </p:par>
+                            </p:childTnLst>
+                          </p:cTn>
+                        </p:par>
+                      </p:childTnLst>
+                    </p:cTn>
+                  </p:par>
+                  <p:par>
+                    <p:cTn id="19" fill="hold">
+                      <p:stCondLst>
+                        <p:cond delay="indefinite"/>
+                      </p:stCondLst>
+                      <p:childTnLst>
+                        <p:par>
+                          <p:cTn id="20" fill="hold">
+                            <p:stCondLst>
+                              <p:cond delay="0"/>
+                            </p:stCondLst>
+                            <p:childTnLst>
+                              <p:par>
+                                <p:cTn id="21" presetID="1" presetClass="entr" presetSubtype="0" fill="hold" nodeType="clickEffect">
+                                  <p:stCondLst>
+                                    <p:cond delay="0"/>
+                                  </p:stCondLst>
+                                  <p:childTnLst>
+                                    <p:set>
+                                      <p:cBhvr>
+                                        <p:cTn id="22" dur="1" fill="hold">
+                                          <p:stCondLst>
+                                            <p:cond delay="0"/>
+                                          </p:stCondLst>
+                                        </p:cTn>
+                                        <p:tgtEl>
+                                          <p:spTgt spid="3">
+                                            <p:txEl>
                                               <p:pRg st="6" end="6"/>
                                             </p:txEl>
                                           </p:spTgt>
@@ -6496,14 +6545,14 @@
                                 </p:cTn>
                               </p:par>
                               <p:par>
-                                <p:cTn id="19" presetID="1" presetClass="entr" presetSubtype="0" fill="hold" grpId="0" nodeType="withEffect">
+                                <p:cTn id="23" presetID="1" presetClass="entr" presetSubtype="0" fill="hold" grpId="0" nodeType="withEffect">
                                   <p:stCondLst>
                                     <p:cond delay="0"/>
                                   </p:stCondLst>
                                   <p:childTnLst>
                                     <p:set>
                                       <p:cBhvr>
-                                        <p:cTn id="20" dur="1" fill="hold">
+                                        <p:cTn id="24" dur="1" fill="hold">
                                           <p:stCondLst>
                                             <p:cond delay="0"/>
                                           </p:stCondLst>
@@ -6762,7 +6811,7 @@
         </p:blipFill>
         <p:spPr>
           <a:xfrm>
-            <a:off x="6205636" y="2721556"/>
+            <a:off x="7744838" y="3855096"/>
             <a:ext cx="1383867" cy="275396"/>
           </a:xfrm>
           <a:prstGeom prst="rect">
@@ -7041,14 +7090,140 @@
                             </p:stCondLst>
                             <p:childTnLst>
                               <p:par>
-                                <p:cTn id="5" presetID="42" presetClass="path" presetSubtype="0" accel="50000" decel="50000" fill="hold" nodeType="clickEffect">
+                                <p:cTn id="5" presetID="1" presetClass="entr" presetSubtype="0" fill="hold" nodeType="clickEffect">
+                                  <p:stCondLst>
+                                    <p:cond delay="0"/>
+                                  </p:stCondLst>
+                                  <p:childTnLst>
+                                    <p:set>
+                                      <p:cBhvr>
+                                        <p:cTn id="6" dur="1" fill="hold">
+                                          <p:stCondLst>
+                                            <p:cond delay="0"/>
+                                          </p:stCondLst>
+                                        </p:cTn>
+                                        <p:tgtEl>
+                                          <p:spTgt spid="12"/>
+                                        </p:tgtEl>
+                                        <p:attrNameLst>
+                                          <p:attrName>style.visibility</p:attrName>
+                                        </p:attrNameLst>
+                                      </p:cBhvr>
+                                      <p:to>
+                                        <p:strVal val="visible"/>
+                                      </p:to>
+                                    </p:set>
+                                  </p:childTnLst>
+                                </p:cTn>
+                              </p:par>
+                              <p:par>
+                                <p:cTn id="7" presetID="1" presetClass="entr" presetSubtype="0" fill="hold" nodeType="withEffect">
+                                  <p:stCondLst>
+                                    <p:cond delay="0"/>
+                                  </p:stCondLst>
+                                  <p:childTnLst>
+                                    <p:set>
+                                      <p:cBhvr>
+                                        <p:cTn id="8" dur="1" fill="hold">
+                                          <p:stCondLst>
+                                            <p:cond delay="0"/>
+                                          </p:stCondLst>
+                                        </p:cTn>
+                                        <p:tgtEl>
+                                          <p:spTgt spid="13"/>
+                                        </p:tgtEl>
+                                        <p:attrNameLst>
+                                          <p:attrName>style.visibility</p:attrName>
+                                        </p:attrNameLst>
+                                      </p:cBhvr>
+                                      <p:to>
+                                        <p:strVal val="visible"/>
+                                      </p:to>
+                                    </p:set>
+                                  </p:childTnLst>
+                                </p:cTn>
+                              </p:par>
+                              <p:par>
+                                <p:cTn id="9" presetID="1" presetClass="entr" presetSubtype="0" fill="hold" nodeType="withEffect">
+                                  <p:stCondLst>
+                                    <p:cond delay="0"/>
+                                  </p:stCondLst>
+                                  <p:childTnLst>
+                                    <p:set>
+                                      <p:cBhvr>
+                                        <p:cTn id="10" dur="1" fill="hold">
+                                          <p:stCondLst>
+                                            <p:cond delay="0"/>
+                                          </p:stCondLst>
+                                        </p:cTn>
+                                        <p:tgtEl>
+                                          <p:spTgt spid="14"/>
+                                        </p:tgtEl>
+                                        <p:attrNameLst>
+                                          <p:attrName>style.visibility</p:attrName>
+                                        </p:attrNameLst>
+                                      </p:cBhvr>
+                                      <p:to>
+                                        <p:strVal val="visible"/>
+                                      </p:to>
+                                    </p:set>
+                                  </p:childTnLst>
+                                </p:cTn>
+                              </p:par>
+                              <p:par>
+                                <p:cTn id="11" presetID="1" presetClass="entr" presetSubtype="0" fill="hold" nodeType="withEffect">
+                                  <p:stCondLst>
+                                    <p:cond delay="0"/>
+                                  </p:stCondLst>
+                                  <p:childTnLst>
+                                    <p:set>
+                                      <p:cBhvr>
+                                        <p:cTn id="12" dur="1" fill="hold">
+                                          <p:stCondLst>
+                                            <p:cond delay="0"/>
+                                          </p:stCondLst>
+                                        </p:cTn>
+                                        <p:tgtEl>
+                                          <p:spTgt spid="11"/>
+                                        </p:tgtEl>
+                                        <p:attrNameLst>
+                                          <p:attrName>style.visibility</p:attrName>
+                                        </p:attrNameLst>
+                                      </p:cBhvr>
+                                      <p:to>
+                                        <p:strVal val="visible"/>
+                                      </p:to>
+                                    </p:set>
+                                  </p:childTnLst>
+                                </p:cTn>
+                              </p:par>
+                            </p:childTnLst>
+                          </p:cTn>
+                        </p:par>
+                      </p:childTnLst>
+                    </p:cTn>
+                  </p:par>
+                  <p:par>
+                    <p:cTn id="13" fill="hold">
+                      <p:stCondLst>
+                        <p:cond delay="indefinite"/>
+                      </p:stCondLst>
+                      <p:childTnLst>
+                        <p:par>
+                          <p:cTn id="14" fill="hold">
+                            <p:stCondLst>
+                              <p:cond delay="0"/>
+                            </p:stCondLst>
+                            <p:childTnLst>
+                              <p:par>
+                                <p:cTn id="15" presetID="42" presetClass="path" presetSubtype="0" accel="50000" decel="50000" fill="hold" nodeType="clickEffect">
                                   <p:stCondLst>
                                     <p:cond delay="0"/>
                                   </p:stCondLst>
                                   <p:childTnLst>
                                     <p:animMotion origin="layout" path="M 4.72222E-6 -1.85185E-6 L 0.12274 -0.29051 " pathEditMode="relative" rAng="0" ptsTypes="AA">
                                       <p:cBhvr>
-                                        <p:cTn id="6" dur="2000" fill="hold"/>
+                                        <p:cTn id="16" dur="2000" fill="hold"/>
                                         <p:tgtEl>
                                           <p:spTgt spid="12"/>
                                         </p:tgtEl>
@@ -7063,14 +7238,14 @@
                                 </p:cTn>
                               </p:par>
                               <p:par>
-                                <p:cTn id="7" presetID="6" presetClass="emph" presetSubtype="0" fill="hold" nodeType="withEffect">
+                                <p:cTn id="17" presetID="6" presetClass="emph" presetSubtype="0" fill="hold" nodeType="withEffect">
                                   <p:stCondLst>
                                     <p:cond delay="0"/>
                                   </p:stCondLst>
                                   <p:childTnLst>
                                     <p:animScale>
                                       <p:cBhvr>
-                                        <p:cTn id="8" dur="2000" fill="hold"/>
+                                        <p:cTn id="18" dur="2000" fill="hold"/>
                                         <p:tgtEl>
                                           <p:spTgt spid="12"/>
                                         </p:tgtEl>
@@ -7081,14 +7256,14 @@
                                 </p:cTn>
                               </p:par>
                               <p:par>
-                                <p:cTn id="9" presetID="42" presetClass="path" presetSubtype="0" accel="50000" decel="50000" fill="hold" nodeType="withEffect">
+                                <p:cTn id="19" presetID="42" presetClass="path" presetSubtype="0" accel="50000" decel="50000" fill="hold" nodeType="withEffect">
                                   <p:stCondLst>
                                     <p:cond delay="0"/>
                                   </p:stCondLst>
                                   <p:childTnLst>
                                     <p:animMotion origin="layout" path="M 2.77778E-7 4.07407E-6 L 0.38941 -0.13774 " pathEditMode="relative" rAng="0" ptsTypes="AA">
                                       <p:cBhvr>
-                                        <p:cTn id="10" dur="2000" fill="hold"/>
+                                        <p:cTn id="20" dur="2000" fill="hold"/>
                                         <p:tgtEl>
                                           <p:spTgt spid="13"/>
                                         </p:tgtEl>
@@ -7103,14 +7278,14 @@
                                 </p:cTn>
                               </p:par>
                               <p:par>
-                                <p:cTn id="11" presetID="6" presetClass="emph" presetSubtype="0" fill="hold" nodeType="withEffect">
+                                <p:cTn id="21" presetID="6" presetClass="emph" presetSubtype="0" fill="hold" nodeType="withEffect">
                                   <p:stCondLst>
                                     <p:cond delay="0"/>
                                   </p:stCondLst>
                                   <p:childTnLst>
                                     <p:animScale>
                                       <p:cBhvr>
-                                        <p:cTn id="12" dur="2000" fill="hold"/>
+                                        <p:cTn id="22" dur="2000" fill="hold"/>
                                         <p:tgtEl>
                                           <p:spTgt spid="13"/>
                                         </p:tgtEl>
@@ -7121,14 +7296,14 @@
                                 </p:cTn>
                               </p:par>
                               <p:par>
-                                <p:cTn id="13" presetID="42" presetClass="path" presetSubtype="0" accel="50000" decel="50000" fill="hold" nodeType="withEffect">
+                                <p:cTn id="23" presetID="42" presetClass="path" presetSubtype="0" accel="50000" decel="50000" fill="hold" nodeType="withEffect">
                                   <p:stCondLst>
                                     <p:cond delay="0"/>
                                   </p:stCondLst>
                                   <p:childTnLst>
-                                    <p:animMotion origin="layout" path="M 0.16059 0.16088 L -0.27014 -0.07431 " pathEditMode="relative" rAng="0" ptsTypes="AA">
+                                    <p:animMotion origin="layout" path="M 3.05556E-6 4.07407E-6 L -0.43073 -0.23519 " pathEditMode="relative" rAng="0" ptsTypes="AA">
                                       <p:cBhvr>
-                                        <p:cTn id="14" dur="2000" fill="hold"/>
+                                        <p:cTn id="24" dur="2000" fill="hold"/>
                                         <p:tgtEl>
                                           <p:spTgt spid="14"/>
                                         </p:tgtEl>
@@ -7143,14 +7318,14 @@
                                 </p:cTn>
                               </p:par>
                               <p:par>
-                                <p:cTn id="15" presetID="6" presetClass="emph" presetSubtype="0" fill="hold" nodeType="withEffect">
+                                <p:cTn id="25" presetID="6" presetClass="emph" presetSubtype="0" fill="hold" nodeType="withEffect">
                                   <p:stCondLst>
                                     <p:cond delay="0"/>
                                   </p:stCondLst>
                                   <p:childTnLst>
                                     <p:animScale>
                                       <p:cBhvr>
-                                        <p:cTn id="16" dur="2000" fill="hold"/>
+                                        <p:cTn id="26" dur="2000" fill="hold"/>
                                         <p:tgtEl>
                                           <p:spTgt spid="14"/>
                                         </p:tgtEl>
@@ -7161,14 +7336,14 @@
                                 </p:cTn>
                               </p:par>
                               <p:par>
-                                <p:cTn id="17" presetID="10" presetClass="exit" presetSubtype="0" fill="hold" nodeType="withEffect">
+                                <p:cTn id="27" presetID="10" presetClass="exit" presetSubtype="0" fill="hold" nodeType="withEffect">
                                   <p:stCondLst>
                                     <p:cond delay="0"/>
                                   </p:stCondLst>
                                   <p:childTnLst>
                                     <p:animEffect transition="out" filter="fade">
                                       <p:cBhvr>
-                                        <p:cTn id="18" dur="500"/>
+                                        <p:cTn id="28" dur="500"/>
                                         <p:tgtEl>
                                           <p:spTgt spid="11"/>
                                         </p:tgtEl>
@@ -7176,7 +7351,7 @@
                                     </p:animEffect>
                                     <p:set>
                                       <p:cBhvr>
-                                        <p:cTn id="19" dur="1" fill="hold">
+                                        <p:cTn id="29" dur="1" fill="hold">
                                           <p:stCondLst>
                                             <p:cond delay="499"/>
                                           </p:stCondLst>
@@ -7202,26 +7377,26 @@
                     </p:cTn>
                   </p:par>
                   <p:par>
-                    <p:cTn id="20" fill="hold">
+                    <p:cTn id="30" fill="hold">
                       <p:stCondLst>
                         <p:cond delay="indefinite"/>
                       </p:stCondLst>
                       <p:childTnLst>
                         <p:par>
-                          <p:cTn id="21" fill="hold">
+                          <p:cTn id="31" fill="hold">
                             <p:stCondLst>
                               <p:cond delay="0"/>
                             </p:stCondLst>
                             <p:childTnLst>
                               <p:par>
-                                <p:cTn id="22" presetID="1" presetClass="entr" presetSubtype="0" fill="hold" grpId="0" nodeType="clickEffect">
+                                <p:cTn id="32" presetID="1" presetClass="entr" presetSubtype="0" fill="hold" grpId="0" nodeType="clickEffect">
                                   <p:stCondLst>
                                     <p:cond delay="0"/>
                                   </p:stCondLst>
                                   <p:childTnLst>
                                     <p:set>
                                       <p:cBhvr>
-                                        <p:cTn id="23" dur="1" fill="hold">
+                                        <p:cTn id="33" dur="1" fill="hold">
                                           <p:stCondLst>
                                             <p:cond delay="0"/>
                                           </p:stCondLst>
@@ -7241,14 +7416,14 @@
                                 </p:cTn>
                               </p:par>
                               <p:par>
-                                <p:cTn id="24" presetID="1" presetClass="entr" presetSubtype="0" fill="hold" nodeType="withEffect">
+                                <p:cTn id="34" presetID="1" presetClass="entr" presetSubtype="0" fill="hold" nodeType="withEffect">
                                   <p:stCondLst>
                                     <p:cond delay="0"/>
                                   </p:stCondLst>
                                   <p:childTnLst>
                                     <p:set>
                                       <p:cBhvr>
-                                        <p:cTn id="25" dur="1" fill="hold">
+                                        <p:cTn id="35" dur="1" fill="hold">
                                           <p:stCondLst>
                                             <p:cond delay="0"/>
                                           </p:stCondLst>
@@ -7274,26 +7449,26 @@
                     </p:cTn>
                   </p:par>
                   <p:par>
-                    <p:cTn id="26" fill="hold">
+                    <p:cTn id="36" fill="hold">
                       <p:stCondLst>
                         <p:cond delay="indefinite"/>
                       </p:stCondLst>
                       <p:childTnLst>
                         <p:par>
-                          <p:cTn id="27" fill="hold">
+                          <p:cTn id="37" fill="hold">
                             <p:stCondLst>
                               <p:cond delay="0"/>
                             </p:stCondLst>
                             <p:childTnLst>
                               <p:par>
-                                <p:cTn id="28" presetID="10" presetClass="exit" presetSubtype="0" fill="hold" grpId="1" nodeType="clickEffect">
+                                <p:cTn id="38" presetID="10" presetClass="exit" presetSubtype="0" fill="hold" grpId="1" nodeType="clickEffect">
                                   <p:stCondLst>
                                     <p:cond delay="0"/>
                                   </p:stCondLst>
                                   <p:childTnLst>
                                     <p:animEffect transition="out" filter="fade">
                                       <p:cBhvr>
-                                        <p:cTn id="29" dur="500"/>
+                                        <p:cTn id="39" dur="500"/>
                                         <p:tgtEl>
                                           <p:spTgt spid="23"/>
                                         </p:tgtEl>
@@ -7301,7 +7476,7 @@
                                     </p:animEffect>
                                     <p:set>
                                       <p:cBhvr>
-                                        <p:cTn id="30" dur="1" fill="hold">
+                                        <p:cTn id="40" dur="1" fill="hold">
                                           <p:stCondLst>
                                             <p:cond delay="499"/>
                                           </p:stCondLst>
@@ -7321,14 +7496,14 @@
                                 </p:cTn>
                               </p:par>
                               <p:par>
-                                <p:cTn id="31" presetID="10" presetClass="exit" presetSubtype="0" fill="hold" nodeType="withEffect">
+                                <p:cTn id="41" presetID="10" presetClass="exit" presetSubtype="0" fill="hold" nodeType="withEffect">
                                   <p:stCondLst>
                                     <p:cond delay="0"/>
                                   </p:stCondLst>
                                   <p:childTnLst>
                                     <p:animEffect transition="out" filter="fade">
                                       <p:cBhvr>
-                                        <p:cTn id="32" dur="500"/>
+                                        <p:cTn id="42" dur="500"/>
                                         <p:tgtEl>
                                           <p:spTgt spid="22"/>
                                         </p:tgtEl>
@@ -7336,7 +7511,7 @@
                                     </p:animEffect>
                                     <p:set>
                                       <p:cBhvr>
-                                        <p:cTn id="33" dur="1" fill="hold">
+                                        <p:cTn id="43" dur="1" fill="hold">
                                           <p:stCondLst>
                                             <p:cond delay="499"/>
                                           </p:stCondLst>
@@ -7359,20 +7534,20 @@
                           </p:cTn>
                         </p:par>
                         <p:par>
-                          <p:cTn id="34" fill="hold">
+                          <p:cTn id="44" fill="hold">
                             <p:stCondLst>
                               <p:cond delay="500"/>
                             </p:stCondLst>
                             <p:childTnLst>
                               <p:par>
-                                <p:cTn id="35" presetID="10" presetClass="entr" presetSubtype="0" fill="hold" grpId="0" nodeType="afterEffect">
+                                <p:cTn id="45" presetID="10" presetClass="entr" presetSubtype="0" fill="hold" grpId="0" nodeType="afterEffect">
                                   <p:stCondLst>
                                     <p:cond delay="0"/>
                                   </p:stCondLst>
                                   <p:childTnLst>
                                     <p:set>
                                       <p:cBhvr>
-                                        <p:cTn id="36" dur="1" fill="hold">
+                                        <p:cTn id="46" dur="1" fill="hold">
                                           <p:stCondLst>
                                             <p:cond delay="0"/>
                                           </p:stCondLst>
@@ -7390,7 +7565,7 @@
                                     </p:set>
                                     <p:animEffect transition="in" filter="fade">
                                       <p:cBhvr>
-                                        <p:cTn id="37" dur="1000"/>
+                                        <p:cTn id="47" dur="1000"/>
                                         <p:tgtEl>
                                           <p:spTgt spid="16"/>
                                         </p:tgtEl>
@@ -7400,14 +7575,14 @@
                                 </p:cTn>
                               </p:par>
                               <p:par>
-                                <p:cTn id="38" presetID="10" presetClass="entr" presetSubtype="0" fill="hold" grpId="0" nodeType="withEffect">
+                                <p:cTn id="48" presetID="10" presetClass="entr" presetSubtype="0" fill="hold" grpId="0" nodeType="withEffect">
                                   <p:stCondLst>
                                     <p:cond delay="0"/>
                                   </p:stCondLst>
                                   <p:childTnLst>
                                     <p:set>
                                       <p:cBhvr>
-                                        <p:cTn id="39" dur="1" fill="hold">
+                                        <p:cTn id="49" dur="1" fill="hold">
                                           <p:stCondLst>
                                             <p:cond delay="0"/>
                                           </p:stCondLst>
@@ -7425,7 +7600,7 @@
                                     </p:set>
                                     <p:animEffect transition="in" filter="fade">
                                       <p:cBhvr>
-                                        <p:cTn id="40" dur="1000"/>
+                                        <p:cTn id="50" dur="1000"/>
                                         <p:tgtEl>
                                           <p:spTgt spid="17"/>
                                         </p:tgtEl>
@@ -7435,14 +7610,14 @@
                                 </p:cTn>
                               </p:par>
                               <p:par>
-                                <p:cTn id="41" presetID="10" presetClass="entr" presetSubtype="0" fill="hold" nodeType="withEffect">
+                                <p:cTn id="51" presetID="10" presetClass="entr" presetSubtype="0" fill="hold" nodeType="withEffect">
                                   <p:stCondLst>
                                     <p:cond delay="0"/>
                                   </p:stCondLst>
                                   <p:childTnLst>
                                     <p:set>
                                       <p:cBhvr>
-                                        <p:cTn id="42" dur="1" fill="hold">
+                                        <p:cTn id="52" dur="1" fill="hold">
                                           <p:stCondLst>
                                             <p:cond delay="0"/>
                                           </p:stCondLst>
@@ -7460,7 +7635,7 @@
                                     </p:set>
                                     <p:animEffect transition="in" filter="fade">
                                       <p:cBhvr>
-                                        <p:cTn id="43" dur="1000"/>
+                                        <p:cTn id="53" dur="1000"/>
                                         <p:tgtEl>
                                           <p:spTgt spid="15"/>
                                         </p:tgtEl>
@@ -7476,26 +7651,26 @@
                     </p:cTn>
                   </p:par>
                   <p:par>
-                    <p:cTn id="44" fill="hold">
+                    <p:cTn id="54" fill="hold">
                       <p:stCondLst>
                         <p:cond delay="indefinite"/>
                       </p:stCondLst>
                       <p:childTnLst>
                         <p:par>
-                          <p:cTn id="45" fill="hold">
+                          <p:cTn id="55" fill="hold">
                             <p:stCondLst>
                               <p:cond delay="0"/>
                             </p:stCondLst>
                             <p:childTnLst>
                               <p:par>
-                                <p:cTn id="46" presetID="1" presetClass="entr" presetSubtype="0" fill="hold" nodeType="clickEffect">
+                                <p:cTn id="56" presetID="1" presetClass="entr" presetSubtype="0" fill="hold" nodeType="clickEffect">
                                   <p:stCondLst>
                                     <p:cond delay="0"/>
                                   </p:stCondLst>
                                   <p:childTnLst>
                                     <p:set>
                                       <p:cBhvr>
-                                        <p:cTn id="47" dur="1" fill="hold">
+                                        <p:cTn id="57" dur="1" fill="hold">
                                           <p:stCondLst>
                                             <p:cond delay="0"/>
                                           </p:stCondLst>
@@ -7515,14 +7690,14 @@
                                 </p:cTn>
                               </p:par>
                               <p:par>
-                                <p:cTn id="48" presetID="1" presetClass="entr" presetSubtype="0" fill="hold" grpId="0" nodeType="withEffect">
+                                <p:cTn id="58" presetID="1" presetClass="entr" presetSubtype="0" fill="hold" grpId="0" nodeType="withEffect">
                                   <p:stCondLst>
                                     <p:cond delay="0"/>
                                   </p:stCondLst>
                                   <p:childTnLst>
                                     <p:set>
                                       <p:cBhvr>
-                                        <p:cTn id="49" dur="1" fill="hold">
+                                        <p:cTn id="59" dur="1" fill="hold">
                                           <p:stCondLst>
                                             <p:cond delay="0"/>
                                           </p:stCondLst>
@@ -7897,14 +8072,257 @@
                             </p:stCondLst>
                             <p:childTnLst>
                               <p:par>
-                                <p:cTn id="5" presetID="10" presetClass="exit" presetSubtype="0" fill="hold" nodeType="clickEffect">
+                                <p:cTn id="5" presetID="1" presetClass="entr" presetSubtype="0" fill="hold" nodeType="clickEffect">
+                                  <p:stCondLst>
+                                    <p:cond delay="0"/>
+                                  </p:stCondLst>
+                                  <p:childTnLst>
+                                    <p:set>
+                                      <p:cBhvr>
+                                        <p:cTn id="6" dur="1" fill="hold">
+                                          <p:stCondLst>
+                                            <p:cond delay="0"/>
+                                          </p:stCondLst>
+                                        </p:cTn>
+                                        <p:tgtEl>
+                                          <p:spTgt spid="24"/>
+                                        </p:tgtEl>
+                                        <p:attrNameLst>
+                                          <p:attrName>style.visibility</p:attrName>
+                                        </p:attrNameLst>
+                                      </p:cBhvr>
+                                      <p:to>
+                                        <p:strVal val="visible"/>
+                                      </p:to>
+                                    </p:set>
+                                  </p:childTnLst>
+                                </p:cTn>
+                              </p:par>
+                              <p:par>
+                                <p:cTn id="7" presetID="1" presetClass="entr" presetSubtype="0" fill="hold" nodeType="withEffect">
+                                  <p:stCondLst>
+                                    <p:cond delay="0"/>
+                                  </p:stCondLst>
+                                  <p:childTnLst>
+                                    <p:set>
+                                      <p:cBhvr>
+                                        <p:cTn id="8" dur="1" fill="hold">
+                                          <p:stCondLst>
+                                            <p:cond delay="0"/>
+                                          </p:stCondLst>
+                                        </p:cTn>
+                                        <p:tgtEl>
+                                          <p:spTgt spid="23"/>
+                                        </p:tgtEl>
+                                        <p:attrNameLst>
+                                          <p:attrName>style.visibility</p:attrName>
+                                        </p:attrNameLst>
+                                      </p:cBhvr>
+                                      <p:to>
+                                        <p:strVal val="visible"/>
+                                      </p:to>
+                                    </p:set>
+                                  </p:childTnLst>
+                                </p:cTn>
+                              </p:par>
+                              <p:par>
+                                <p:cTn id="9" presetID="1" presetClass="entr" presetSubtype="0" fill="hold" nodeType="withEffect">
+                                  <p:stCondLst>
+                                    <p:cond delay="0"/>
+                                  </p:stCondLst>
+                                  <p:childTnLst>
+                                    <p:set>
+                                      <p:cBhvr>
+                                        <p:cTn id="10" dur="1" fill="hold">
+                                          <p:stCondLst>
+                                            <p:cond delay="0"/>
+                                          </p:stCondLst>
+                                        </p:cTn>
+                                        <p:tgtEl>
+                                          <p:spTgt spid="19"/>
+                                        </p:tgtEl>
+                                        <p:attrNameLst>
+                                          <p:attrName>style.visibility</p:attrName>
+                                        </p:attrNameLst>
+                                      </p:cBhvr>
+                                      <p:to>
+                                        <p:strVal val="visible"/>
+                                      </p:to>
+                                    </p:set>
+                                  </p:childTnLst>
+                                </p:cTn>
+                              </p:par>
+                              <p:par>
+                                <p:cTn id="11" presetID="1" presetClass="entr" presetSubtype="0" fill="hold" nodeType="withEffect">
+                                  <p:stCondLst>
+                                    <p:cond delay="0"/>
+                                  </p:stCondLst>
+                                  <p:childTnLst>
+                                    <p:set>
+                                      <p:cBhvr>
+                                        <p:cTn id="12" dur="1" fill="hold">
+                                          <p:stCondLst>
+                                            <p:cond delay="0"/>
+                                          </p:stCondLst>
+                                        </p:cTn>
+                                        <p:tgtEl>
+                                          <p:spTgt spid="18"/>
+                                        </p:tgtEl>
+                                        <p:attrNameLst>
+                                          <p:attrName>style.visibility</p:attrName>
+                                        </p:attrNameLst>
+                                      </p:cBhvr>
+                                      <p:to>
+                                        <p:strVal val="visible"/>
+                                      </p:to>
+                                    </p:set>
+                                  </p:childTnLst>
+                                </p:cTn>
+                              </p:par>
+                              <p:par>
+                                <p:cTn id="13" presetID="1" presetClass="entr" presetSubtype="0" fill="hold" nodeType="withEffect">
+                                  <p:stCondLst>
+                                    <p:cond delay="0"/>
+                                  </p:stCondLst>
+                                  <p:childTnLst>
+                                    <p:set>
+                                      <p:cBhvr>
+                                        <p:cTn id="14" dur="1" fill="hold">
+                                          <p:stCondLst>
+                                            <p:cond delay="0"/>
+                                          </p:stCondLst>
+                                        </p:cTn>
+                                        <p:tgtEl>
+                                          <p:spTgt spid="20"/>
+                                        </p:tgtEl>
+                                        <p:attrNameLst>
+                                          <p:attrName>style.visibility</p:attrName>
+                                        </p:attrNameLst>
+                                      </p:cBhvr>
+                                      <p:to>
+                                        <p:strVal val="visible"/>
+                                      </p:to>
+                                    </p:set>
+                                  </p:childTnLst>
+                                </p:cTn>
+                              </p:par>
+                              <p:par>
+                                <p:cTn id="15" presetID="1" presetClass="entr" presetSubtype="0" fill="hold" nodeType="withEffect">
+                                  <p:stCondLst>
+                                    <p:cond delay="0"/>
+                                  </p:stCondLst>
+                                  <p:childTnLst>
+                                    <p:set>
+                                      <p:cBhvr>
+                                        <p:cTn id="16" dur="1" fill="hold">
+                                          <p:stCondLst>
+                                            <p:cond delay="0"/>
+                                          </p:stCondLst>
+                                        </p:cTn>
+                                        <p:tgtEl>
+                                          <p:spTgt spid="21"/>
+                                        </p:tgtEl>
+                                        <p:attrNameLst>
+                                          <p:attrName>style.visibility</p:attrName>
+                                        </p:attrNameLst>
+                                      </p:cBhvr>
+                                      <p:to>
+                                        <p:strVal val="visible"/>
+                                      </p:to>
+                                    </p:set>
+                                  </p:childTnLst>
+                                </p:cTn>
+                              </p:par>
+                              <p:par>
+                                <p:cTn id="17" presetID="1" presetClass="entr" presetSubtype="0" fill="hold" grpId="0" nodeType="withEffect" nodePh="1">
+                                  <p:stCondLst>
+                                    <p:cond delay="0"/>
+                                  </p:stCondLst>
+                                  <p:endCondLst>
+                                    <p:cond evt="begin" delay="0">
+                                      <p:tn val="17"/>
+                                    </p:cond>
+                                  </p:endCondLst>
+                                  <p:childTnLst>
+                                    <p:set>
+                                      <p:cBhvr>
+                                        <p:cTn id="18" dur="1" fill="hold">
+                                          <p:stCondLst>
+                                            <p:cond delay="0"/>
+                                          </p:stCondLst>
+                                        </p:cTn>
+                                        <p:tgtEl>
+                                          <p:spTgt spid="3">
+                                            <p:txEl>
+                                              <p:pRg st="0" end="0"/>
+                                            </p:txEl>
+                                          </p:spTgt>
+                                        </p:tgtEl>
+                                        <p:attrNameLst>
+                                          <p:attrName>style.visibility</p:attrName>
+                                        </p:attrNameLst>
+                                      </p:cBhvr>
+                                      <p:to>
+                                        <p:strVal val="visible"/>
+                                      </p:to>
+                                    </p:set>
+                                  </p:childTnLst>
+                                </p:cTn>
+                              </p:par>
+                              <p:par>
+                                <p:cTn id="19" presetID="1" presetClass="entr" presetSubtype="0" fill="hold" nodeType="withEffect">
+                                  <p:stCondLst>
+                                    <p:cond delay="0"/>
+                                  </p:stCondLst>
+                                  <p:childTnLst>
+                                    <p:set>
+                                      <p:cBhvr>
+                                        <p:cTn id="20" dur="1" fill="hold">
+                                          <p:stCondLst>
+                                            <p:cond delay="0"/>
+                                          </p:stCondLst>
+                                        </p:cTn>
+                                        <p:tgtEl>
+                                          <p:spTgt spid="16"/>
+                                        </p:tgtEl>
+                                        <p:attrNameLst>
+                                          <p:attrName>style.visibility</p:attrName>
+                                        </p:attrNameLst>
+                                      </p:cBhvr>
+                                      <p:to>
+                                        <p:strVal val="visible"/>
+                                      </p:to>
+                                    </p:set>
+                                  </p:childTnLst>
+                                </p:cTn>
+                              </p:par>
+                            </p:childTnLst>
+                          </p:cTn>
+                        </p:par>
+                      </p:childTnLst>
+                    </p:cTn>
+                  </p:par>
+                  <p:par>
+                    <p:cTn id="21" fill="hold">
+                      <p:stCondLst>
+                        <p:cond delay="indefinite"/>
+                      </p:stCondLst>
+                      <p:childTnLst>
+                        <p:par>
+                          <p:cTn id="22" fill="hold">
+                            <p:stCondLst>
+                              <p:cond delay="0"/>
+                            </p:stCondLst>
+                            <p:childTnLst>
+                              <p:par>
+                                <p:cTn id="23" presetID="10" presetClass="exit" presetSubtype="0" fill="hold" nodeType="clickEffect">
                                   <p:stCondLst>
                                     <p:cond delay="0"/>
                                   </p:stCondLst>
                                   <p:childTnLst>
                                     <p:animEffect transition="out" filter="fade">
                                       <p:cBhvr>
-                                        <p:cTn id="6" dur="500"/>
+                                        <p:cTn id="24" dur="500"/>
                                         <p:tgtEl>
                                           <p:spTgt spid="24"/>
                                         </p:tgtEl>
@@ -7912,7 +8330,7 @@
                                     </p:animEffect>
                                     <p:set>
                                       <p:cBhvr>
-                                        <p:cTn id="7" dur="1" fill="hold">
+                                        <p:cTn id="25" dur="1" fill="hold">
                                           <p:stCondLst>
                                             <p:cond delay="499"/>
                                           </p:stCondLst>
@@ -7932,14 +8350,14 @@
                                 </p:cTn>
                               </p:par>
                               <p:par>
-                                <p:cTn id="8" presetID="6" presetClass="emph" presetSubtype="0" fill="hold" nodeType="withEffect">
+                                <p:cTn id="26" presetID="6" presetClass="emph" presetSubtype="0" fill="hold" nodeType="withEffect">
                                   <p:stCondLst>
                                     <p:cond delay="0"/>
                                   </p:stCondLst>
                                   <p:childTnLst>
                                     <p:animScale>
                                       <p:cBhvr>
-                                        <p:cTn id="9" dur="2000" fill="hold"/>
+                                        <p:cTn id="27" dur="2000" fill="hold"/>
                                         <p:tgtEl>
                                           <p:spTgt spid="23"/>
                                         </p:tgtEl>
@@ -7953,20 +8371,20 @@
                           </p:cTn>
                         </p:par>
                         <p:par>
-                          <p:cTn id="10" fill="hold">
+                          <p:cTn id="28" fill="hold">
                             <p:stCondLst>
                               <p:cond delay="2000"/>
                             </p:stCondLst>
                             <p:childTnLst>
                               <p:par>
-                                <p:cTn id="11" presetID="10" presetClass="exit" presetSubtype="0" fill="hold" nodeType="afterEffect">
+                                <p:cTn id="29" presetID="10" presetClass="exit" presetSubtype="0" fill="hold" nodeType="afterEffect">
                                   <p:stCondLst>
                                     <p:cond delay="0"/>
                                   </p:stCondLst>
                                   <p:childTnLst>
                                     <p:animEffect transition="out" filter="fade">
                                       <p:cBhvr>
-                                        <p:cTn id="12" dur="500"/>
+                                        <p:cTn id="30" dur="500"/>
                                         <p:tgtEl>
                                           <p:spTgt spid="23"/>
                                         </p:tgtEl>
@@ -7974,7 +8392,7 @@
                                     </p:animEffect>
                                     <p:set>
                                       <p:cBhvr>
-                                        <p:cTn id="13" dur="1" fill="hold">
+                                        <p:cTn id="31" dur="1" fill="hold">
                                           <p:stCondLst>
                                             <p:cond delay="499"/>
                                           </p:stCondLst>
@@ -8000,26 +8418,26 @@
                     </p:cTn>
                   </p:par>
                   <p:par>
-                    <p:cTn id="14" fill="hold">
+                    <p:cTn id="32" fill="hold">
                       <p:stCondLst>
                         <p:cond delay="indefinite"/>
                       </p:stCondLst>
                       <p:childTnLst>
                         <p:par>
-                          <p:cTn id="15" fill="hold">
+                          <p:cTn id="33" fill="hold">
                             <p:stCondLst>
                               <p:cond delay="0"/>
                             </p:stCondLst>
                             <p:childTnLst>
                               <p:par>
-                                <p:cTn id="16" presetID="42" presetClass="path" presetSubtype="0" accel="50000" decel="50000" fill="hold" nodeType="clickEffect">
+                                <p:cTn id="34" presetID="42" presetClass="path" presetSubtype="0" accel="50000" decel="50000" fill="hold" nodeType="clickEffect">
                                   <p:stCondLst>
                                     <p:cond delay="0"/>
                                   </p:stCondLst>
                                   <p:childTnLst>
                                     <p:animMotion origin="layout" path="M 8.33333E-7 7.40741E-7 L 0.1717 0.00347 " pathEditMode="relative" rAng="0" ptsTypes="AA">
                                       <p:cBhvr>
-                                        <p:cTn id="17" dur="2000" fill="hold"/>
+                                        <p:cTn id="35" dur="2000" fill="hold"/>
                                         <p:tgtEl>
                                           <p:spTgt spid="19"/>
                                         </p:tgtEl>
@@ -8034,14 +8452,14 @@
                                 </p:cTn>
                               </p:par>
                               <p:par>
-                                <p:cTn id="18" presetID="6" presetClass="emph" presetSubtype="0" decel="25000" fill="hold" nodeType="withEffect">
+                                <p:cTn id="36" presetID="6" presetClass="emph" presetSubtype="0" decel="25000" fill="hold" nodeType="withEffect">
                                   <p:stCondLst>
                                     <p:cond delay="0"/>
                                   </p:stCondLst>
                                   <p:childTnLst>
                                     <p:animScale>
                                       <p:cBhvr>
-                                        <p:cTn id="19" dur="2000" fill="hold"/>
+                                        <p:cTn id="37" dur="2000" fill="hold"/>
                                         <p:tgtEl>
                                           <p:spTgt spid="19"/>
                                         </p:tgtEl>
@@ -8055,20 +8473,20 @@
                           </p:cTn>
                         </p:par>
                         <p:par>
-                          <p:cTn id="20" fill="hold">
+                          <p:cTn id="38" fill="hold">
                             <p:stCondLst>
                               <p:cond delay="2000"/>
                             </p:stCondLst>
                             <p:childTnLst>
                               <p:par>
-                                <p:cTn id="21" presetID="6" presetClass="emph" presetSubtype="0" fill="hold" nodeType="afterEffect">
+                                <p:cTn id="39" presetID="6" presetClass="emph" presetSubtype="0" fill="hold" nodeType="afterEffect">
                                   <p:stCondLst>
                                     <p:cond delay="0"/>
                                   </p:stCondLst>
                                   <p:childTnLst>
                                     <p:animScale>
                                       <p:cBhvr>
-                                        <p:cTn id="22" dur="2000" fill="hold"/>
+                                        <p:cTn id="40" dur="2000" fill="hold"/>
                                         <p:tgtEl>
                                           <p:spTgt spid="19"/>
                                         </p:tgtEl>
@@ -8085,26 +8503,26 @@
                     </p:cTn>
                   </p:par>
                   <p:par>
-                    <p:cTn id="23" fill="hold">
+                    <p:cTn id="41" fill="hold">
                       <p:stCondLst>
                         <p:cond delay="indefinite"/>
                       </p:stCondLst>
                       <p:childTnLst>
                         <p:par>
-                          <p:cTn id="24" fill="hold">
+                          <p:cTn id="42" fill="hold">
                             <p:stCondLst>
                               <p:cond delay="0"/>
                             </p:stCondLst>
                             <p:childTnLst>
                               <p:par>
-                                <p:cTn id="25" presetID="6" presetClass="emph" presetSubtype="0" decel="25000" fill="hold" nodeType="clickEffect">
+                                <p:cTn id="43" presetID="6" presetClass="emph" presetSubtype="0" decel="25000" fill="hold" nodeType="clickEffect">
                                   <p:stCondLst>
                                     <p:cond delay="0"/>
                                   </p:stCondLst>
                                   <p:childTnLst>
                                     <p:animScale>
                                       <p:cBhvr>
-                                        <p:cTn id="26" dur="2000" fill="hold"/>
+                                        <p:cTn id="44" dur="2000" fill="hold"/>
                                         <p:tgtEl>
                                           <p:spTgt spid="18"/>
                                         </p:tgtEl>
@@ -8115,14 +8533,14 @@
                                 </p:cTn>
                               </p:par>
                               <p:par>
-                                <p:cTn id="27" presetID="42" presetClass="path" presetSubtype="0" accel="50000" decel="50000" fill="hold" nodeType="withEffect">
+                                <p:cTn id="45" presetID="42" presetClass="path" presetSubtype="0" accel="50000" decel="50000" fill="hold" nodeType="withEffect">
                                   <p:stCondLst>
                                     <p:cond delay="0"/>
                                   </p:stCondLst>
                                   <p:childTnLst>
                                     <p:animMotion origin="layout" path="M 1.66667E-6 4.07407E-6 L 0.36719 -0.10533 " pathEditMode="relative" rAng="0" ptsTypes="AA">
                                       <p:cBhvr>
-                                        <p:cTn id="28" dur="2000" fill="hold"/>
+                                        <p:cTn id="46" dur="2000" fill="hold"/>
                                         <p:tgtEl>
                                           <p:spTgt spid="18"/>
                                         </p:tgtEl>
@@ -8137,14 +8555,14 @@
                                 </p:cTn>
                               </p:par>
                               <p:par>
-                                <p:cTn id="29" presetID="6" presetClass="emph" presetSubtype="0" decel="25000" fill="hold" nodeType="withEffect">
+                                <p:cTn id="47" presetID="6" presetClass="emph" presetSubtype="0" decel="25000" fill="hold" nodeType="withEffect">
                                   <p:stCondLst>
                                     <p:cond delay="0"/>
                                   </p:stCondLst>
                                   <p:childTnLst>
                                     <p:animScale>
                                       <p:cBhvr>
-                                        <p:cTn id="30" dur="2000" fill="hold"/>
+                                        <p:cTn id="48" dur="2000" fill="hold"/>
                                         <p:tgtEl>
                                           <p:spTgt spid="20"/>
                                         </p:tgtEl>
@@ -8155,14 +8573,14 @@
                                 </p:cTn>
                               </p:par>
                               <p:par>
-                                <p:cTn id="31" presetID="42" presetClass="path" presetSubtype="0" accel="50000" decel="50000" fill="hold" nodeType="withEffect">
+                                <p:cTn id="49" presetID="42" presetClass="path" presetSubtype="0" accel="50000" decel="50000" fill="hold" nodeType="withEffect">
                                   <p:stCondLst>
                                     <p:cond delay="0"/>
                                   </p:stCondLst>
                                   <p:childTnLst>
                                     <p:animMotion origin="layout" path="M -8.33333E-7 -7.40741E-7 L 0.05243 0.23032 " pathEditMode="relative" rAng="0" ptsTypes="AA">
                                       <p:cBhvr>
-                                        <p:cTn id="32" dur="2000" fill="hold"/>
+                                        <p:cTn id="50" dur="2000" fill="hold"/>
                                         <p:tgtEl>
                                           <p:spTgt spid="20"/>
                                         </p:tgtEl>
@@ -8177,14 +8595,14 @@
                                 </p:cTn>
                               </p:par>
                               <p:par>
-                                <p:cTn id="33" presetID="6" presetClass="emph" presetSubtype="0" decel="25000" fill="hold" nodeType="withEffect">
+                                <p:cTn id="51" presetID="6" presetClass="emph" presetSubtype="0" decel="25000" fill="hold" nodeType="withEffect">
                                   <p:stCondLst>
                                     <p:cond delay="0"/>
                                   </p:stCondLst>
                                   <p:childTnLst>
                                     <p:animScale>
                                       <p:cBhvr>
-                                        <p:cTn id="34" dur="2000" fill="hold"/>
+                                        <p:cTn id="52" dur="2000" fill="hold"/>
                                         <p:tgtEl>
                                           <p:spTgt spid="21"/>
                                         </p:tgtEl>
@@ -8195,14 +8613,14 @@
                                 </p:cTn>
                               </p:par>
                               <p:par>
-                                <p:cTn id="35" presetID="42" presetClass="path" presetSubtype="0" accel="50000" decel="50000" fill="hold" nodeType="withEffect">
+                                <p:cTn id="53" presetID="42" presetClass="path" presetSubtype="0" accel="50000" decel="50000" fill="hold" nodeType="withEffect">
                                   <p:stCondLst>
                                     <p:cond delay="0"/>
                                   </p:stCondLst>
                                   <p:childTnLst>
                                     <p:animMotion origin="layout" path="M -5.55556E-7 7.40741E-7 L -0.20017 0.18495 " pathEditMode="relative" rAng="0" ptsTypes="AA">
                                       <p:cBhvr>
-                                        <p:cTn id="36" dur="2000" fill="hold"/>
+                                        <p:cTn id="54" dur="2000" fill="hold"/>
                                         <p:tgtEl>
                                           <p:spTgt spid="21"/>
                                         </p:tgtEl>
@@ -8220,20 +8638,20 @@
                           </p:cTn>
                         </p:par>
                         <p:par>
-                          <p:cTn id="37" fill="hold">
+                          <p:cTn id="55" fill="hold">
                             <p:stCondLst>
                               <p:cond delay="2000"/>
                             </p:stCondLst>
                             <p:childTnLst>
                               <p:par>
-                                <p:cTn id="38" presetID="6" presetClass="emph" presetSubtype="0" fill="hold" nodeType="afterEffect">
+                                <p:cTn id="56" presetID="6" presetClass="emph" presetSubtype="0" fill="hold" nodeType="afterEffect">
                                   <p:stCondLst>
                                     <p:cond delay="0"/>
                                   </p:stCondLst>
                                   <p:childTnLst>
                                     <p:animScale>
                                       <p:cBhvr>
-                                        <p:cTn id="39" dur="2000" fill="hold"/>
+                                        <p:cTn id="57" dur="2000" fill="hold"/>
                                         <p:tgtEl>
                                           <p:spTgt spid="20"/>
                                         </p:tgtEl>
@@ -8244,14 +8662,14 @@
                                 </p:cTn>
                               </p:par>
                               <p:par>
-                                <p:cTn id="40" presetID="1" presetClass="exit" presetSubtype="0" fill="hold" nodeType="withEffect">
+                                <p:cTn id="58" presetID="1" presetClass="exit" presetSubtype="0" fill="hold" nodeType="withEffect">
                                   <p:stCondLst>
                                     <p:cond delay="0"/>
                                   </p:stCondLst>
                                   <p:childTnLst>
                                     <p:set>
                                       <p:cBhvr>
-                                        <p:cTn id="41" dur="1" fill="hold">
+                                        <p:cTn id="59" dur="1" fill="hold">
                                           <p:stCondLst>
                                             <p:cond delay="0"/>
                                           </p:stCondLst>
@@ -8271,14 +8689,14 @@
                                 </p:cTn>
                               </p:par>
                               <p:par>
-                                <p:cTn id="42" presetID="1" presetClass="exit" presetSubtype="0" fill="hold" nodeType="withEffect">
+                                <p:cTn id="60" presetID="1" presetClass="exit" presetSubtype="0" fill="hold" nodeType="withEffect">
                                   <p:stCondLst>
                                     <p:cond delay="0"/>
                                   </p:stCondLst>
                                   <p:childTnLst>
                                     <p:set>
                                       <p:cBhvr>
-                                        <p:cTn id="43" dur="1" fill="hold">
+                                        <p:cTn id="61" dur="1" fill="hold">
                                           <p:stCondLst>
                                             <p:cond delay="0"/>
                                           </p:stCondLst>
@@ -8324,6 +8742,9 @@
         </p:cTn>
       </p:par>
     </p:tnLst>
+    <p:bldLst>
+      <p:bldP spid="3" grpId="0" build="p"/>
+    </p:bldLst>
   </p:timing>
 </p:sld>
 </file>
@@ -9950,11 +10371,7 @@
           <a:p>
             <a:r>
               <a:rPr lang="en-US" dirty="0" smtClean="0"/>
-              <a:t>IT </a:t>
-            </a:r>
-            <a:r>
-              <a:rPr lang="en-US" dirty="0" smtClean="0"/>
-              <a:t>Changes – Application usage view</a:t>
+              <a:t>IT Changes – Application usage view</a:t>
             </a:r>
             <a:endParaRPr lang="en-US" dirty="0"/>
           </a:p>
@@ -11140,11 +11557,7 @@
           <a:p>
             <a:r>
               <a:rPr lang="en-US" dirty="0" smtClean="0"/>
-              <a:t>IT </a:t>
-            </a:r>
-            <a:r>
-              <a:rPr lang="en-US" dirty="0" smtClean="0"/>
-              <a:t>Changes – Infrastructure view </a:t>
+              <a:t>IT Changes – Infrastructure view </a:t>
             </a:r>
             <a:endParaRPr lang="en-US" dirty="0"/>
           </a:p>

</xml_diff>

<commit_message>
Changes in the gap analysis, report and presentation.
</commit_message>
<xml_diff>
--- a/Presentation/FINAL_PRESENTATION_AIS_GROUP3.pptx
+++ b/Presentation/FINAL_PRESENTATION_AIS_GROUP3.pptx
@@ -150,7 +150,7 @@
   </p:defaultTextStyle>
   <p:extLst>
     <p:ext uri="{EFAFB233-063F-42B5-8137-9DF3F51BA10A}">
-      <p15:sldGuideLst xmlns:p15="http://schemas.microsoft.com/office/powerpoint/2012/main">
+      <p15:sldGuideLst xmlns:p15="http://schemas.microsoft.com/office/powerpoint/2012/main" xmlns="">
         <p15:guide id="1" orient="horz" pos="2160">
           <p15:clr>
             <a:srgbClr val="A4A3A4"/>
@@ -9072,7 +9072,7 @@
                             </p:stCondLst>
                             <p:childTnLst>
                               <p:par>
-                                <p:cTn id="5" presetID="10" presetClass="entr" presetSubtype="0" fill="hold" nodeType="clickEffect">
+                                <p:cTn id="5" presetID="10" presetClass="entr" presetSubtype="0" fill="hold" grpId="0" nodeType="clickEffect">
                                   <p:stCondLst>
                                     <p:cond delay="0"/>
                                   </p:stCondLst>
@@ -9080,6 +9080,343 @@
                                     <p:set>
                                       <p:cBhvr>
                                         <p:cTn id="6" dur="1" fill="hold">
+                                          <p:stCondLst>
+                                            <p:cond delay="0"/>
+                                          </p:stCondLst>
+                                        </p:cTn>
+                                        <p:tgtEl>
+                                          <p:spTgt spid="3">
+                                            <p:txEl>
+                                              <p:pRg st="0" end="0"/>
+                                            </p:txEl>
+                                          </p:spTgt>
+                                        </p:tgtEl>
+                                        <p:attrNameLst>
+                                          <p:attrName>style.visibility</p:attrName>
+                                        </p:attrNameLst>
+                                      </p:cBhvr>
+                                      <p:to>
+                                        <p:strVal val="visible"/>
+                                      </p:to>
+                                    </p:set>
+                                    <p:animEffect transition="in" filter="fade">
+                                      <p:cBhvr>
+                                        <p:cTn id="7" dur="500"/>
+                                        <p:tgtEl>
+                                          <p:spTgt spid="3">
+                                            <p:txEl>
+                                              <p:pRg st="0" end="0"/>
+                                            </p:txEl>
+                                          </p:spTgt>
+                                        </p:tgtEl>
+                                      </p:cBhvr>
+                                    </p:animEffect>
+                                  </p:childTnLst>
+                                </p:cTn>
+                              </p:par>
+                              <p:par>
+                                <p:cTn id="8" presetID="10" presetClass="entr" presetSubtype="0" fill="hold" grpId="0" nodeType="withEffect">
+                                  <p:stCondLst>
+                                    <p:cond delay="0"/>
+                                  </p:stCondLst>
+                                  <p:childTnLst>
+                                    <p:set>
+                                      <p:cBhvr>
+                                        <p:cTn id="9" dur="1" fill="hold">
+                                          <p:stCondLst>
+                                            <p:cond delay="0"/>
+                                          </p:stCondLst>
+                                        </p:cTn>
+                                        <p:tgtEl>
+                                          <p:spTgt spid="3">
+                                            <p:txEl>
+                                              <p:pRg st="1" end="1"/>
+                                            </p:txEl>
+                                          </p:spTgt>
+                                        </p:tgtEl>
+                                        <p:attrNameLst>
+                                          <p:attrName>style.visibility</p:attrName>
+                                        </p:attrNameLst>
+                                      </p:cBhvr>
+                                      <p:to>
+                                        <p:strVal val="visible"/>
+                                      </p:to>
+                                    </p:set>
+                                    <p:animEffect transition="in" filter="fade">
+                                      <p:cBhvr>
+                                        <p:cTn id="10" dur="500"/>
+                                        <p:tgtEl>
+                                          <p:spTgt spid="3">
+                                            <p:txEl>
+                                              <p:pRg st="1" end="1"/>
+                                            </p:txEl>
+                                          </p:spTgt>
+                                        </p:tgtEl>
+                                      </p:cBhvr>
+                                    </p:animEffect>
+                                  </p:childTnLst>
+                                </p:cTn>
+                              </p:par>
+                              <p:par>
+                                <p:cTn id="11" presetID="10" presetClass="entr" presetSubtype="0" fill="hold" grpId="0" nodeType="withEffect">
+                                  <p:stCondLst>
+                                    <p:cond delay="0"/>
+                                  </p:stCondLst>
+                                  <p:childTnLst>
+                                    <p:set>
+                                      <p:cBhvr>
+                                        <p:cTn id="12" dur="1" fill="hold">
+                                          <p:stCondLst>
+                                            <p:cond delay="0"/>
+                                          </p:stCondLst>
+                                        </p:cTn>
+                                        <p:tgtEl>
+                                          <p:spTgt spid="3">
+                                            <p:txEl>
+                                              <p:pRg st="2" end="2"/>
+                                            </p:txEl>
+                                          </p:spTgt>
+                                        </p:tgtEl>
+                                        <p:attrNameLst>
+                                          <p:attrName>style.visibility</p:attrName>
+                                        </p:attrNameLst>
+                                      </p:cBhvr>
+                                      <p:to>
+                                        <p:strVal val="visible"/>
+                                      </p:to>
+                                    </p:set>
+                                    <p:animEffect transition="in" filter="fade">
+                                      <p:cBhvr>
+                                        <p:cTn id="13" dur="500"/>
+                                        <p:tgtEl>
+                                          <p:spTgt spid="3">
+                                            <p:txEl>
+                                              <p:pRg st="2" end="2"/>
+                                            </p:txEl>
+                                          </p:spTgt>
+                                        </p:tgtEl>
+                                      </p:cBhvr>
+                                    </p:animEffect>
+                                  </p:childTnLst>
+                                </p:cTn>
+                              </p:par>
+                              <p:par>
+                                <p:cTn id="14" presetID="10" presetClass="entr" presetSubtype="0" fill="hold" grpId="0" nodeType="withEffect">
+                                  <p:stCondLst>
+                                    <p:cond delay="0"/>
+                                  </p:stCondLst>
+                                  <p:childTnLst>
+                                    <p:set>
+                                      <p:cBhvr>
+                                        <p:cTn id="15" dur="1" fill="hold">
+                                          <p:stCondLst>
+                                            <p:cond delay="0"/>
+                                          </p:stCondLst>
+                                        </p:cTn>
+                                        <p:tgtEl>
+                                          <p:spTgt spid="3">
+                                            <p:txEl>
+                                              <p:pRg st="3" end="3"/>
+                                            </p:txEl>
+                                          </p:spTgt>
+                                        </p:tgtEl>
+                                        <p:attrNameLst>
+                                          <p:attrName>style.visibility</p:attrName>
+                                        </p:attrNameLst>
+                                      </p:cBhvr>
+                                      <p:to>
+                                        <p:strVal val="visible"/>
+                                      </p:to>
+                                    </p:set>
+                                    <p:animEffect transition="in" filter="fade">
+                                      <p:cBhvr>
+                                        <p:cTn id="16" dur="500"/>
+                                        <p:tgtEl>
+                                          <p:spTgt spid="3">
+                                            <p:txEl>
+                                              <p:pRg st="3" end="3"/>
+                                            </p:txEl>
+                                          </p:spTgt>
+                                        </p:tgtEl>
+                                      </p:cBhvr>
+                                    </p:animEffect>
+                                  </p:childTnLst>
+                                </p:cTn>
+                              </p:par>
+                              <p:par>
+                                <p:cTn id="17" presetID="10" presetClass="entr" presetSubtype="0" fill="hold" grpId="0" nodeType="withEffect">
+                                  <p:stCondLst>
+                                    <p:cond delay="0"/>
+                                  </p:stCondLst>
+                                  <p:childTnLst>
+                                    <p:set>
+                                      <p:cBhvr>
+                                        <p:cTn id="18" dur="1" fill="hold">
+                                          <p:stCondLst>
+                                            <p:cond delay="0"/>
+                                          </p:stCondLst>
+                                        </p:cTn>
+                                        <p:tgtEl>
+                                          <p:spTgt spid="3">
+                                            <p:txEl>
+                                              <p:pRg st="4" end="4"/>
+                                            </p:txEl>
+                                          </p:spTgt>
+                                        </p:tgtEl>
+                                        <p:attrNameLst>
+                                          <p:attrName>style.visibility</p:attrName>
+                                        </p:attrNameLst>
+                                      </p:cBhvr>
+                                      <p:to>
+                                        <p:strVal val="visible"/>
+                                      </p:to>
+                                    </p:set>
+                                    <p:animEffect transition="in" filter="fade">
+                                      <p:cBhvr>
+                                        <p:cTn id="19" dur="500"/>
+                                        <p:tgtEl>
+                                          <p:spTgt spid="3">
+                                            <p:txEl>
+                                              <p:pRg st="4" end="4"/>
+                                            </p:txEl>
+                                          </p:spTgt>
+                                        </p:tgtEl>
+                                      </p:cBhvr>
+                                    </p:animEffect>
+                                  </p:childTnLst>
+                                </p:cTn>
+                              </p:par>
+                              <p:par>
+                                <p:cTn id="20" presetID="10" presetClass="entr" presetSubtype="0" fill="hold" grpId="0" nodeType="withEffect">
+                                  <p:stCondLst>
+                                    <p:cond delay="0"/>
+                                  </p:stCondLst>
+                                  <p:childTnLst>
+                                    <p:set>
+                                      <p:cBhvr>
+                                        <p:cTn id="21" dur="1" fill="hold">
+                                          <p:stCondLst>
+                                            <p:cond delay="0"/>
+                                          </p:stCondLst>
+                                        </p:cTn>
+                                        <p:tgtEl>
+                                          <p:spTgt spid="3">
+                                            <p:txEl>
+                                              <p:pRg st="5" end="5"/>
+                                            </p:txEl>
+                                          </p:spTgt>
+                                        </p:tgtEl>
+                                        <p:attrNameLst>
+                                          <p:attrName>style.visibility</p:attrName>
+                                        </p:attrNameLst>
+                                      </p:cBhvr>
+                                      <p:to>
+                                        <p:strVal val="visible"/>
+                                      </p:to>
+                                    </p:set>
+                                    <p:animEffect transition="in" filter="fade">
+                                      <p:cBhvr>
+                                        <p:cTn id="22" dur="500"/>
+                                        <p:tgtEl>
+                                          <p:spTgt spid="3">
+                                            <p:txEl>
+                                              <p:pRg st="5" end="5"/>
+                                            </p:txEl>
+                                          </p:spTgt>
+                                        </p:tgtEl>
+                                      </p:cBhvr>
+                                    </p:animEffect>
+                                  </p:childTnLst>
+                                </p:cTn>
+                              </p:par>
+                            </p:childTnLst>
+                          </p:cTn>
+                        </p:par>
+                      </p:childTnLst>
+                    </p:cTn>
+                  </p:par>
+                  <p:par>
+                    <p:cTn id="23" fill="hold">
+                      <p:stCondLst>
+                        <p:cond delay="indefinite"/>
+                      </p:stCondLst>
+                      <p:childTnLst>
+                        <p:par>
+                          <p:cTn id="24" fill="hold">
+                            <p:stCondLst>
+                              <p:cond delay="0"/>
+                            </p:stCondLst>
+                            <p:childTnLst>
+                              <p:par>
+                                <p:cTn id="25" presetID="10" presetClass="entr" presetSubtype="0" fill="hold" grpId="0" nodeType="clickEffect">
+                                  <p:stCondLst>
+                                    <p:cond delay="0"/>
+                                  </p:stCondLst>
+                                  <p:childTnLst>
+                                    <p:set>
+                                      <p:cBhvr>
+                                        <p:cTn id="26" dur="1" fill="hold">
+                                          <p:stCondLst>
+                                            <p:cond delay="0"/>
+                                          </p:stCondLst>
+                                        </p:cTn>
+                                        <p:tgtEl>
+                                          <p:spTgt spid="3">
+                                            <p:txEl>
+                                              <p:pRg st="6" end="6"/>
+                                            </p:txEl>
+                                          </p:spTgt>
+                                        </p:tgtEl>
+                                        <p:attrNameLst>
+                                          <p:attrName>style.visibility</p:attrName>
+                                        </p:attrNameLst>
+                                      </p:cBhvr>
+                                      <p:to>
+                                        <p:strVal val="visible"/>
+                                      </p:to>
+                                    </p:set>
+                                    <p:animEffect transition="in" filter="fade">
+                                      <p:cBhvr>
+                                        <p:cTn id="27" dur="500"/>
+                                        <p:tgtEl>
+                                          <p:spTgt spid="3">
+                                            <p:txEl>
+                                              <p:pRg st="6" end="6"/>
+                                            </p:txEl>
+                                          </p:spTgt>
+                                        </p:tgtEl>
+                                      </p:cBhvr>
+                                    </p:animEffect>
+                                  </p:childTnLst>
+                                </p:cTn>
+                              </p:par>
+                            </p:childTnLst>
+                          </p:cTn>
+                        </p:par>
+                      </p:childTnLst>
+                    </p:cTn>
+                  </p:par>
+                  <p:par>
+                    <p:cTn id="28" fill="hold">
+                      <p:stCondLst>
+                        <p:cond delay="indefinite"/>
+                      </p:stCondLst>
+                      <p:childTnLst>
+                        <p:par>
+                          <p:cTn id="29" fill="hold">
+                            <p:stCondLst>
+                              <p:cond delay="0"/>
+                            </p:stCondLst>
+                            <p:childTnLst>
+                              <p:par>
+                                <p:cTn id="30" presetID="10" presetClass="entr" presetSubtype="0" fill="hold" grpId="0" nodeType="clickEffect">
+                                  <p:stCondLst>
+                                    <p:cond delay="0"/>
+                                  </p:stCondLst>
+                                  <p:childTnLst>
+                                    <p:set>
+                                      <p:cBhvr>
+                                        <p:cTn id="31" dur="1" fill="hold">
                                           <p:stCondLst>
                                             <p:cond delay="0"/>
                                           </p:stCondLst>
@@ -9101,7 +9438,7 @@
                                     </p:set>
                                     <p:animEffect transition="in" filter="fade">
                                       <p:cBhvr>
-                                        <p:cTn id="7" dur="500"/>
+                                        <p:cTn id="32" dur="500"/>
                                         <p:tgtEl>
                                           <p:spTgt spid="3">
                                             <p:txEl>
@@ -9114,15 +9451,33 @@
                                   </p:childTnLst>
                                 </p:cTn>
                               </p:par>
+                            </p:childTnLst>
+                          </p:cTn>
+                        </p:par>
+                      </p:childTnLst>
+                    </p:cTn>
+                  </p:par>
+                  <p:par>
+                    <p:cTn id="33" fill="hold">
+                      <p:stCondLst>
+                        <p:cond delay="indefinite"/>
+                      </p:stCondLst>
+                      <p:childTnLst>
+                        <p:par>
+                          <p:cTn id="34" fill="hold">
+                            <p:stCondLst>
+                              <p:cond delay="0"/>
+                            </p:stCondLst>
+                            <p:childTnLst>
                               <p:par>
-                                <p:cTn id="8" presetID="10" presetClass="entr" presetSubtype="0" fill="hold" nodeType="withEffect">
+                                <p:cTn id="35" presetID="10" presetClass="entr" presetSubtype="0" fill="hold" grpId="0" nodeType="clickEffect">
                                   <p:stCondLst>
                                     <p:cond delay="0"/>
                                   </p:stCondLst>
                                   <p:childTnLst>
                                     <p:set>
                                       <p:cBhvr>
-                                        <p:cTn id="9" dur="1" fill="hold">
+                                        <p:cTn id="36" dur="1" fill="hold">
                                           <p:stCondLst>
                                             <p:cond delay="0"/>
                                           </p:stCondLst>
@@ -9144,7 +9499,7 @@
                                     </p:set>
                                     <p:animEffect transition="in" filter="fade">
                                       <p:cBhvr>
-                                        <p:cTn id="10" dur="500"/>
+                                        <p:cTn id="37" dur="500"/>
                                         <p:tgtEl>
                                           <p:spTgt spid="3">
                                             <p:txEl>
@@ -9158,14 +9513,14 @@
                                 </p:cTn>
                               </p:par>
                               <p:par>
-                                <p:cTn id="11" presetID="10" presetClass="entr" presetSubtype="0" fill="hold" nodeType="withEffect">
+                                <p:cTn id="38" presetID="10" presetClass="entr" presetSubtype="0" fill="hold" grpId="0" nodeType="withEffect">
                                   <p:stCondLst>
                                     <p:cond delay="0"/>
                                   </p:stCondLst>
                                   <p:childTnLst>
                                     <p:set>
                                       <p:cBhvr>
-                                        <p:cTn id="12" dur="1" fill="hold">
+                                        <p:cTn id="39" dur="1" fill="hold">
                                           <p:stCondLst>
                                             <p:cond delay="0"/>
                                           </p:stCondLst>
@@ -9187,7 +9542,7 @@
                                     </p:set>
                                     <p:animEffect transition="in" filter="fade">
                                       <p:cBhvr>
-                                        <p:cTn id="13" dur="500"/>
+                                        <p:cTn id="40" dur="500"/>
                                         <p:tgtEl>
                                           <p:spTgt spid="3">
                                             <p:txEl>
@@ -9201,14 +9556,14 @@
                                 </p:cTn>
                               </p:par>
                               <p:par>
-                                <p:cTn id="14" presetID="10" presetClass="entr" presetSubtype="0" fill="hold" nodeType="withEffect">
+                                <p:cTn id="41" presetID="10" presetClass="entr" presetSubtype="0" fill="hold" grpId="0" nodeType="withEffect">
                                   <p:stCondLst>
                                     <p:cond delay="0"/>
                                   </p:stCondLst>
                                   <p:childTnLst>
                                     <p:set>
                                       <p:cBhvr>
-                                        <p:cTn id="15" dur="1" fill="hold">
+                                        <p:cTn id="42" dur="1" fill="hold">
                                           <p:stCondLst>
                                             <p:cond delay="0"/>
                                           </p:stCondLst>
@@ -9230,7 +9585,7 @@
                                     </p:set>
                                     <p:animEffect transition="in" filter="fade">
                                       <p:cBhvr>
-                                        <p:cTn id="16" dur="500"/>
+                                        <p:cTn id="43" dur="500"/>
                                         <p:tgtEl>
                                           <p:spTgt spid="3">
                                             <p:txEl>
@@ -9244,14 +9599,14 @@
                                 </p:cTn>
                               </p:par>
                               <p:par>
-                                <p:cTn id="17" presetID="10" presetClass="entr" presetSubtype="0" fill="hold" nodeType="withEffect">
+                                <p:cTn id="44" presetID="10" presetClass="entr" presetSubtype="0" fill="hold" grpId="0" nodeType="withEffect">
                                   <p:stCondLst>
                                     <p:cond delay="0"/>
                                   </p:stCondLst>
                                   <p:childTnLst>
                                     <p:set>
                                       <p:cBhvr>
-                                        <p:cTn id="18" dur="1" fill="hold">
+                                        <p:cTn id="45" dur="1" fill="hold">
                                           <p:stCondLst>
                                             <p:cond delay="0"/>
                                           </p:stCondLst>
@@ -9273,7 +9628,7 @@
                                     </p:set>
                                     <p:animEffect transition="in" filter="fade">
                                       <p:cBhvr>
-                                        <p:cTn id="19" dur="500"/>
+                                        <p:cTn id="46" dur="500"/>
                                         <p:tgtEl>
                                           <p:spTgt spid="3">
                                             <p:txEl>
@@ -9313,6 +9668,9 @@
         </p:cTn>
       </p:par>
     </p:tnLst>
+    <p:bldLst>
+      <p:bldP spid="3" grpId="0" uiExpand="1" build="p"/>
+    </p:bldLst>
   </p:timing>
 </p:sld>
 </file>

</xml_diff>